<commit_message>
Changed future scope in ppt
</commit_message>
<xml_diff>
--- a/Documentation/SCS Group E Project Presentation.pptx
+++ b/Documentation/SCS Group E Project Presentation.pptx
@@ -5,7 +5,7 @@
     <p:sldMasterId id="2147483648" r:id="rId1"/>
   </p:sldMasterIdLst>
   <p:notesMasterIdLst>
-    <p:notesMasterId r:id="rId33"/>
+    <p:notesMasterId r:id="rId34"/>
   </p:notesMasterIdLst>
   <p:sldIdLst>
     <p:sldId id="266" r:id="rId2"/>
@@ -36,9 +36,10 @@
     <p:sldId id="286" r:id="rId27"/>
     <p:sldId id="295" r:id="rId28"/>
     <p:sldId id="287" r:id="rId29"/>
-    <p:sldId id="289" r:id="rId30"/>
-    <p:sldId id="305" r:id="rId31"/>
-    <p:sldId id="284" r:id="rId32"/>
+    <p:sldId id="307" r:id="rId30"/>
+    <p:sldId id="289" r:id="rId31"/>
+    <p:sldId id="305" r:id="rId32"/>
+    <p:sldId id="284" r:id="rId33"/>
   </p:sldIdLst>
   <p:sldSz cx="12192000" cy="6858000"/>
   <p:notesSz cx="6858000" cy="9144000"/>
@@ -227,7 +228,7 @@
           <a:p>
             <a:fld id="{3A0BAD34-9031-415E-AECE-B344CF13514B}" type="datetimeFigureOut">
               <a:rPr lang="en-IN" smtClean="0"/>
-              <a:t>24-02-2020</a:t>
+              <a:t>26-02-2020</a:t>
             </a:fld>
             <a:endParaRPr lang="en-IN"/>
           </a:p>
@@ -941,7 +942,7 @@
           <a:p>
             <a:fld id="{BC849E9A-41F7-4779-A581-48A7C374A227}" type="slidenum">
               <a:rPr lang="en-US" smtClean="0"/>
-              <a:t>30</a:t>
+              <a:t>31</a:t>
             </a:fld>
             <a:endParaRPr lang="en-US" dirty="0"/>
           </a:p>
@@ -2349,7 +2350,7 @@
           <a:p>
             <a:fld id="{F9E89688-87D8-4D65-AD50-C3D265D58C72}" type="datetimeFigureOut">
               <a:rPr lang="en-IN" smtClean="0"/>
-              <a:t>24-02-2020</a:t>
+              <a:t>26-02-2020</a:t>
             </a:fld>
             <a:endParaRPr lang="en-IN"/>
           </a:p>
@@ -2549,7 +2550,7 @@
           <a:p>
             <a:fld id="{F9E89688-87D8-4D65-AD50-C3D265D58C72}" type="datetimeFigureOut">
               <a:rPr lang="en-IN" smtClean="0"/>
-              <a:t>24-02-2020</a:t>
+              <a:t>26-02-2020</a:t>
             </a:fld>
             <a:endParaRPr lang="en-IN"/>
           </a:p>
@@ -2759,7 +2760,7 @@
           <a:p>
             <a:fld id="{F9E89688-87D8-4D65-AD50-C3D265D58C72}" type="datetimeFigureOut">
               <a:rPr lang="en-IN" smtClean="0"/>
-              <a:t>24-02-2020</a:t>
+              <a:t>26-02-2020</a:t>
             </a:fld>
             <a:endParaRPr lang="en-IN"/>
           </a:p>
@@ -2959,7 +2960,7 @@
           <a:p>
             <a:fld id="{F9E89688-87D8-4D65-AD50-C3D265D58C72}" type="datetimeFigureOut">
               <a:rPr lang="en-IN" smtClean="0"/>
-              <a:t>24-02-2020</a:t>
+              <a:t>26-02-2020</a:t>
             </a:fld>
             <a:endParaRPr lang="en-IN"/>
           </a:p>
@@ -3235,7 +3236,7 @@
           <a:p>
             <a:fld id="{F9E89688-87D8-4D65-AD50-C3D265D58C72}" type="datetimeFigureOut">
               <a:rPr lang="en-IN" smtClean="0"/>
-              <a:t>24-02-2020</a:t>
+              <a:t>26-02-2020</a:t>
             </a:fld>
             <a:endParaRPr lang="en-IN"/>
           </a:p>
@@ -3503,7 +3504,7 @@
           <a:p>
             <a:fld id="{F9E89688-87D8-4D65-AD50-C3D265D58C72}" type="datetimeFigureOut">
               <a:rPr lang="en-IN" smtClean="0"/>
-              <a:t>24-02-2020</a:t>
+              <a:t>26-02-2020</a:t>
             </a:fld>
             <a:endParaRPr lang="en-IN"/>
           </a:p>
@@ -3918,7 +3919,7 @@
           <a:p>
             <a:fld id="{F9E89688-87D8-4D65-AD50-C3D265D58C72}" type="datetimeFigureOut">
               <a:rPr lang="en-IN" smtClean="0"/>
-              <a:t>24-02-2020</a:t>
+              <a:t>26-02-2020</a:t>
             </a:fld>
             <a:endParaRPr lang="en-IN"/>
           </a:p>
@@ -4060,7 +4061,7 @@
           <a:p>
             <a:fld id="{F9E89688-87D8-4D65-AD50-C3D265D58C72}" type="datetimeFigureOut">
               <a:rPr lang="en-IN" smtClean="0"/>
-              <a:t>24-02-2020</a:t>
+              <a:t>26-02-2020</a:t>
             </a:fld>
             <a:endParaRPr lang="en-IN"/>
           </a:p>
@@ -4173,7 +4174,7 @@
           <a:p>
             <a:fld id="{F9E89688-87D8-4D65-AD50-C3D265D58C72}" type="datetimeFigureOut">
               <a:rPr lang="en-IN" smtClean="0"/>
-              <a:t>24-02-2020</a:t>
+              <a:t>26-02-2020</a:t>
             </a:fld>
             <a:endParaRPr lang="en-IN"/>
           </a:p>
@@ -4486,7 +4487,7 @@
           <a:p>
             <a:fld id="{F9E89688-87D8-4D65-AD50-C3D265D58C72}" type="datetimeFigureOut">
               <a:rPr lang="en-IN" smtClean="0"/>
-              <a:t>24-02-2020</a:t>
+              <a:t>26-02-2020</a:t>
             </a:fld>
             <a:endParaRPr lang="en-IN"/>
           </a:p>
@@ -4775,7 +4776,7 @@
           <a:p>
             <a:fld id="{F9E89688-87D8-4D65-AD50-C3D265D58C72}" type="datetimeFigureOut">
               <a:rPr lang="en-IN" smtClean="0"/>
-              <a:t>24-02-2020</a:t>
+              <a:t>26-02-2020</a:t>
             </a:fld>
             <a:endParaRPr lang="en-IN"/>
           </a:p>
@@ -5018,7 +5019,7 @@
           <a:p>
             <a:fld id="{F9E89688-87D8-4D65-AD50-C3D265D58C72}" type="datetimeFigureOut">
               <a:rPr lang="en-IN" smtClean="0"/>
-              <a:t>24-02-2020</a:t>
+              <a:t>26-02-2020</a:t>
             </a:fld>
             <a:endParaRPr lang="en-IN"/>
           </a:p>
@@ -6373,13 +6374,13 @@
   <p:clrMapOvr>
     <a:masterClrMapping/>
   </p:clrMapOvr>
-  <mc:AlternateContent xmlns:mc="http://schemas.openxmlformats.org/markup-compatibility/2006">
-    <mc:Choice xmlns:p159="http://schemas.microsoft.com/office/powerpoint/2015/09/main" Requires="p159">
+  <mc:AlternateContent xmlns:mc="http://schemas.openxmlformats.org/markup-compatibility/2006" xmlns:p159="http://schemas.microsoft.com/office/powerpoint/2015/09/main">
+    <mc:Choice Requires="p159">
       <p:transition xmlns:p14="http://schemas.microsoft.com/office/powerpoint/2010/main" spd="slow" p14:dur="2000" advTm="24815">
         <p159:morph option="byObject"/>
       </p:transition>
     </mc:Choice>
-    <mc:Fallback>
+    <mc:Fallback xmlns="">
       <p:transition spd="slow" advTm="24815">
         <p:fade/>
       </p:transition>
@@ -10835,7 +10836,7 @@
           <p:cNvPr id="2" name="Title 1">
             <a:extLst>
               <a:ext uri="{FF2B5EF4-FFF2-40B4-BE49-F238E27FC236}">
-                <a16:creationId xmlns:a16="http://schemas.microsoft.com/office/drawing/2014/main" id="{8801B698-02B7-4514-8A24-8CBE182E411A}"/>
+                <a16:creationId xmlns:a16="http://schemas.microsoft.com/office/drawing/2014/main" id="{2AD77AE2-03A2-4EF5-A00F-DAE13279E64F}"/>
               </a:ext>
             </a:extLst>
           </p:cNvPr>
@@ -10848,20 +10849,63 @@
         </p:nvSpPr>
         <p:spPr>
           <a:xfrm>
-            <a:off x="838200" y="2766218"/>
-            <a:ext cx="10515600" cy="1325563"/>
+            <a:off x="0" y="365125"/>
+            <a:ext cx="11353800" cy="1325563"/>
           </a:xfrm>
         </p:spPr>
         <p:txBody>
-          <a:bodyPr>
-            <a:normAutofit/>
-          </a:bodyPr>
+          <a:bodyPr/>
           <a:lstStyle/>
           <a:p>
-            <a:pPr algn="ctr"/>
-            <a:r>
-              <a:rPr lang="en-IN" sz="6000" b="1" dirty="0"/>
-              <a:t>Conclusion &amp; Future Scope</a:t>
+            <a:r>
+              <a:rPr lang="en-IN" b="1" dirty="0"/>
+              <a:t>Future Scope</a:t>
+            </a:r>
+          </a:p>
+        </p:txBody>
+      </p:sp>
+      <p:sp>
+        <p:nvSpPr>
+          <p:cNvPr id="3" name="Content Placeholder 2">
+            <a:extLst>
+              <a:ext uri="{FF2B5EF4-FFF2-40B4-BE49-F238E27FC236}">
+                <a16:creationId xmlns:a16="http://schemas.microsoft.com/office/drawing/2014/main" id="{C61CA751-767C-4A68-8061-70CC399104E9}"/>
+              </a:ext>
+            </a:extLst>
+          </p:cNvPr>
+          <p:cNvSpPr>
+            <a:spLocks noGrp="1"/>
+          </p:cNvSpPr>
+          <p:nvPr>
+            <p:ph idx="1"/>
+          </p:nvPr>
+        </p:nvSpPr>
+        <p:spPr/>
+        <p:txBody>
+          <a:bodyPr/>
+          <a:lstStyle/>
+          <a:p>
+            <a:r>
+              <a:rPr lang="en-IN" dirty="0"/>
+              <a:t>Multiple perspective like Admin, Doctor.</a:t>
+            </a:r>
+          </a:p>
+          <a:p>
+            <a:r>
+              <a:rPr lang="en-IN" dirty="0"/>
+              <a:t>Manual mode</a:t>
+            </a:r>
+          </a:p>
+          <a:p>
+            <a:r>
+              <a:rPr lang="en-IN" dirty="0"/>
+              <a:t>Sound based alerts</a:t>
+            </a:r>
+          </a:p>
+          <a:p>
+            <a:r>
+              <a:rPr lang="en-IN" dirty="0"/>
+              <a:t>Calculation of BSL on other factors like age, weight, medical history etc</a:t>
             </a:r>
           </a:p>
         </p:txBody>
@@ -10869,7 +10913,7 @@
     </p:spTree>
     <p:extLst>
       <p:ext uri="{BB962C8B-B14F-4D97-AF65-F5344CB8AC3E}">
-        <p14:creationId xmlns:p14="http://schemas.microsoft.com/office/powerpoint/2010/main" val="671552406"/>
+        <p14:creationId xmlns:p14="http://schemas.microsoft.com/office/powerpoint/2010/main" val="4017915665"/>
       </p:ext>
     </p:extLst>
   </p:cSld>
@@ -11037,6 +11081,72 @@
           <p:cNvPr id="2" name="Title 1">
             <a:extLst>
               <a:ext uri="{FF2B5EF4-FFF2-40B4-BE49-F238E27FC236}">
+                <a16:creationId xmlns:a16="http://schemas.microsoft.com/office/drawing/2014/main" id="{8801B698-02B7-4514-8A24-8CBE182E411A}"/>
+              </a:ext>
+            </a:extLst>
+          </p:cNvPr>
+          <p:cNvSpPr>
+            <a:spLocks noGrp="1"/>
+          </p:cNvSpPr>
+          <p:nvPr>
+            <p:ph type="title"/>
+          </p:nvPr>
+        </p:nvSpPr>
+        <p:spPr>
+          <a:xfrm>
+            <a:off x="838200" y="2766218"/>
+            <a:ext cx="10515600" cy="1325563"/>
+          </a:xfrm>
+        </p:spPr>
+        <p:txBody>
+          <a:bodyPr>
+            <a:normAutofit/>
+          </a:bodyPr>
+          <a:lstStyle/>
+          <a:p>
+            <a:pPr algn="ctr"/>
+            <a:r>
+              <a:rPr lang="en-IN" sz="6000" b="1" dirty="0"/>
+              <a:t>Conclusion</a:t>
+            </a:r>
+          </a:p>
+        </p:txBody>
+      </p:sp>
+    </p:spTree>
+    <p:extLst>
+      <p:ext uri="{BB962C8B-B14F-4D97-AF65-F5344CB8AC3E}">
+        <p14:creationId xmlns:p14="http://schemas.microsoft.com/office/powerpoint/2010/main" val="671552406"/>
+      </p:ext>
+    </p:extLst>
+  </p:cSld>
+  <p:clrMapOvr>
+    <a:masterClrMapping/>
+  </p:clrMapOvr>
+</p:sld>
+</file>
+
+<file path=ppt/slides/slide31.xml><?xml version="1.0" encoding="utf-8"?>
+<p:sld xmlns:a="http://schemas.openxmlformats.org/drawingml/2006/main" xmlns:r="http://schemas.openxmlformats.org/officeDocument/2006/relationships" xmlns:p="http://schemas.openxmlformats.org/presentationml/2006/main">
+  <p:cSld>
+    <p:spTree>
+      <p:nvGrpSpPr>
+        <p:cNvPr id="1" name=""/>
+        <p:cNvGrpSpPr/>
+        <p:nvPr/>
+      </p:nvGrpSpPr>
+      <p:grpSpPr>
+        <a:xfrm>
+          <a:off x="0" y="0"/>
+          <a:ext cx="0" cy="0"/>
+          <a:chOff x="0" y="0"/>
+          <a:chExt cx="0" cy="0"/>
+        </a:xfrm>
+      </p:grpSpPr>
+      <p:sp>
+        <p:nvSpPr>
+          <p:cNvPr id="2" name="Title 1">
+            <a:extLst>
+              <a:ext uri="{FF2B5EF4-FFF2-40B4-BE49-F238E27FC236}">
                 <a16:creationId xmlns:a16="http://schemas.microsoft.com/office/drawing/2014/main" id="{EA0D9B4E-C292-45AA-8116-562703040382}"/>
               </a:ext>
             </a:extLst>
@@ -11373,7 +11483,7 @@
 </p:sld>
 </file>
 
-<file path=ppt/slides/slide31.xml><?xml version="1.0" encoding="utf-8"?>
+<file path=ppt/slides/slide32.xml><?xml version="1.0" encoding="utf-8"?>
 <p:sld xmlns:a="http://schemas.openxmlformats.org/drawingml/2006/main" xmlns:r="http://schemas.openxmlformats.org/officeDocument/2006/relationships" xmlns:p="http://schemas.openxmlformats.org/presentationml/2006/main">
   <p:cSld>
     <p:spTree>

</xml_diff>